<commit_message>
Updated sound design presentation
</commit_message>
<xml_diff>
--- a/_OTHER FILES/Assignments/Sound Design/Spaceship Pilot - Presentation.pptx
+++ b/_OTHER FILES/Assignments/Sound Design/Spaceship Pilot - Presentation.pptx
@@ -15,9 +15,9 @@
     <p:sldId id="267" r:id="rId9"/>
     <p:sldId id="266" r:id="rId10"/>
     <p:sldId id="259" r:id="rId11"/>
-    <p:sldId id="260" r:id="rId12"/>
-    <p:sldId id="270" r:id="rId13"/>
-    <p:sldId id="269" r:id="rId14"/>
+    <p:sldId id="278" r:id="rId12"/>
+    <p:sldId id="280" r:id="rId13"/>
+    <p:sldId id="279" r:id="rId14"/>
     <p:sldId id="261" r:id="rId15"/>
     <p:sldId id="277" r:id="rId16"/>
     <p:sldId id="276" r:id="rId17"/>
@@ -5361,242 +5361,105 @@
           </a:p>
         </p:txBody>
       </p:sp>
-      <p:grpSp>
-        <p:nvGrpSpPr>
-          <p:cNvPr id="4" name="Gruppieren 3">
-            <a:extLst>
-              <a:ext uri="{FF2B5EF4-FFF2-40B4-BE49-F238E27FC236}">
-                <a16:creationId xmlns:a16="http://schemas.microsoft.com/office/drawing/2014/main" id="{DD9243E5-B49E-40AE-B3B2-7D9509A8D214}"/>
-              </a:ext>
-            </a:extLst>
-          </p:cNvPr>
-          <p:cNvGrpSpPr/>
+      <p:sp>
+        <p:nvSpPr>
+          <p:cNvPr id="7" name="Textfeld 6">
+            <a:extLst>
+              <a:ext uri="{FF2B5EF4-FFF2-40B4-BE49-F238E27FC236}">
+                <a16:creationId xmlns:a16="http://schemas.microsoft.com/office/drawing/2014/main" id="{5FD8B385-5599-4DC5-9390-376AD2BF70AB}"/>
+              </a:ext>
+            </a:extLst>
+          </p:cNvPr>
+          <p:cNvSpPr txBox="1"/>
           <p:nvPr/>
-        </p:nvGrpSpPr>
-        <p:grpSpPr>
-          <a:xfrm>
-            <a:off x="440690" y="1578001"/>
-            <a:ext cx="4594860" cy="809266"/>
-            <a:chOff x="3501390" y="1390651"/>
-            <a:chExt cx="4594860" cy="809266"/>
-          </a:xfrm>
-        </p:grpSpPr>
-        <p:sp>
-          <p:nvSpPr>
-            <p:cNvPr id="7" name="Textfeld 6">
-              <a:extLst>
-                <a:ext uri="{FF2B5EF4-FFF2-40B4-BE49-F238E27FC236}">
-                  <a16:creationId xmlns:a16="http://schemas.microsoft.com/office/drawing/2014/main" id="{5FD8B385-5599-4DC5-9390-376AD2BF70AB}"/>
-                </a:ext>
-              </a:extLst>
-            </p:cNvPr>
-            <p:cNvSpPr txBox="1"/>
-            <p:nvPr/>
-          </p:nvSpPr>
-          <p:spPr>
-            <a:xfrm>
-              <a:off x="3501390" y="1514623"/>
-              <a:ext cx="4594860" cy="584775"/>
-            </a:xfrm>
-            <a:prstGeom prst="rect">
-              <a:avLst/>
-            </a:prstGeom>
-            <a:noFill/>
-          </p:spPr>
-          <p:txBody>
-            <a:bodyPr wrap="square" rtlCol="0">
-              <a:spAutoFit/>
-            </a:bodyPr>
-            <a:lstStyle/>
-            <a:p>
-              <a:pPr algn="ctr"/>
-              <a:r>
-                <a:rPr lang="en-US" sz="3200" dirty="0">
-                  <a:solidFill>
-                    <a:srgbClr val="A49E9E"/>
-                  </a:solidFill>
-                  <a:latin typeface="Electrolize" panose="02000506000000020004" pitchFamily="2" charset="0"/>
-                </a:rPr>
-                <a:t>Team: Concept outline</a:t>
-              </a:r>
-            </a:p>
-          </p:txBody>
-        </p:sp>
-        <p:sp>
-          <p:nvSpPr>
-            <p:cNvPr id="8" name="Rechteck: eine Ecke abgeschnitten 7">
-              <a:extLst>
-                <a:ext uri="{FF2B5EF4-FFF2-40B4-BE49-F238E27FC236}">
-                  <a16:creationId xmlns:a16="http://schemas.microsoft.com/office/drawing/2014/main" id="{EE1813EB-5516-442B-BE86-1998D2191114}"/>
-                </a:ext>
-              </a:extLst>
-            </p:cNvPr>
-            <p:cNvSpPr/>
-            <p:nvPr/>
-          </p:nvSpPr>
-          <p:spPr>
-            <a:xfrm>
-              <a:off x="3501390" y="1390651"/>
-              <a:ext cx="4594860" cy="809266"/>
-            </a:xfrm>
-            <a:prstGeom prst="snip1Rect">
-              <a:avLst>
-                <a:gd name="adj" fmla="val 24957"/>
-              </a:avLst>
-            </a:prstGeom>
-            <a:noFill/>
-            <a:ln w="38100">
-              <a:solidFill>
-                <a:srgbClr val="A49E9E"/>
-              </a:solidFill>
-            </a:ln>
-          </p:spPr>
-          <p:style>
-            <a:lnRef idx="2">
-              <a:schemeClr val="accent1">
-                <a:shade val="50000"/>
-              </a:schemeClr>
-            </a:lnRef>
-            <a:fillRef idx="1">
-              <a:schemeClr val="accent1"/>
-            </a:fillRef>
-            <a:effectRef idx="0">
-              <a:schemeClr val="accent1"/>
-            </a:effectRef>
-            <a:fontRef idx="minor">
-              <a:schemeClr val="lt1"/>
-            </a:fontRef>
-          </p:style>
-          <p:txBody>
-            <a:bodyPr rtlCol="0" anchor="ctr"/>
-            <a:lstStyle/>
-            <a:p>
-              <a:pPr algn="ctr"/>
-              <a:endParaRPr lang="en-US"/>
-            </a:p>
-          </p:txBody>
-        </p:sp>
-      </p:grpSp>
-      <p:grpSp>
-        <p:nvGrpSpPr>
-          <p:cNvPr id="9" name="Gruppieren 8">
-            <a:extLst>
-              <a:ext uri="{FF2B5EF4-FFF2-40B4-BE49-F238E27FC236}">
-                <a16:creationId xmlns:a16="http://schemas.microsoft.com/office/drawing/2014/main" id="{8CCB6722-FBB7-4B69-B355-FFEFA853CA50}"/>
-              </a:ext>
-            </a:extLst>
-          </p:cNvPr>
-          <p:cNvGrpSpPr/>
+        </p:nvSpPr>
+        <p:spPr>
+          <a:xfrm>
+            <a:off x="1717640" y="1701973"/>
+            <a:ext cx="8745309" cy="584775"/>
+          </a:xfrm>
+          <a:prstGeom prst="rect">
+            <a:avLst/>
+          </a:prstGeom>
+          <a:noFill/>
+        </p:spPr>
+        <p:txBody>
+          <a:bodyPr wrap="square" rtlCol="0">
+            <a:spAutoFit/>
+          </a:bodyPr>
+          <a:lstStyle/>
+          <a:p>
+            <a:pPr algn="ctr"/>
+            <a:r>
+              <a:rPr lang="en-US" sz="3200" dirty="0">
+                <a:solidFill>
+                  <a:srgbClr val="A49E9E"/>
+                </a:solidFill>
+                <a:latin typeface="Electrolize" panose="02000506000000020004" pitchFamily="2" charset="0"/>
+              </a:rPr>
+              <a:t>Team: Concept outline &amp; sound mapping</a:t>
+            </a:r>
+          </a:p>
+        </p:txBody>
+      </p:sp>
+      <p:sp>
+        <p:nvSpPr>
+          <p:cNvPr id="8" name="Rechteck: eine Ecke abgeschnitten 7">
+            <a:extLst>
+              <a:ext uri="{FF2B5EF4-FFF2-40B4-BE49-F238E27FC236}">
+                <a16:creationId xmlns:a16="http://schemas.microsoft.com/office/drawing/2014/main" id="{EE1813EB-5516-442B-BE86-1998D2191114}"/>
+              </a:ext>
+            </a:extLst>
+          </p:cNvPr>
+          <p:cNvSpPr/>
           <p:nvPr/>
-        </p:nvGrpSpPr>
-        <p:grpSpPr>
-          <a:xfrm>
-            <a:off x="7156452" y="1589727"/>
-            <a:ext cx="4594860" cy="809266"/>
-            <a:chOff x="3501390" y="1390651"/>
-            <a:chExt cx="4594860" cy="809266"/>
-          </a:xfrm>
-        </p:grpSpPr>
-        <p:sp>
-          <p:nvSpPr>
-            <p:cNvPr id="10" name="Textfeld 9">
-              <a:extLst>
-                <a:ext uri="{FF2B5EF4-FFF2-40B4-BE49-F238E27FC236}">
-                  <a16:creationId xmlns:a16="http://schemas.microsoft.com/office/drawing/2014/main" id="{E58A9E9C-8FFA-4979-B5E7-BE6941EA08D5}"/>
-                </a:ext>
-              </a:extLst>
-            </p:cNvPr>
-            <p:cNvSpPr txBox="1"/>
-            <p:nvPr/>
-          </p:nvSpPr>
-          <p:spPr>
-            <a:xfrm>
-              <a:off x="3501390" y="1514623"/>
-              <a:ext cx="4594860" cy="584775"/>
-            </a:xfrm>
-            <a:prstGeom prst="rect">
-              <a:avLst/>
-            </a:prstGeom>
-            <a:noFill/>
-          </p:spPr>
-          <p:txBody>
-            <a:bodyPr wrap="square" rtlCol="0">
-              <a:spAutoFit/>
-            </a:bodyPr>
-            <a:lstStyle/>
-            <a:p>
-              <a:pPr algn="ctr"/>
-              <a:r>
-                <a:rPr lang="en-US" sz="3200" dirty="0">
-                  <a:solidFill>
-                    <a:srgbClr val="A49E9E"/>
-                  </a:solidFill>
-                  <a:latin typeface="Electrolize" panose="02000506000000020004" pitchFamily="2" charset="0"/>
-                </a:rPr>
-                <a:t>Team: Sound mapping</a:t>
-              </a:r>
-            </a:p>
-          </p:txBody>
-        </p:sp>
-        <p:sp>
-          <p:nvSpPr>
-            <p:cNvPr id="11" name="Rechteck: eine Ecke abgeschnitten 10">
-              <a:extLst>
-                <a:ext uri="{FF2B5EF4-FFF2-40B4-BE49-F238E27FC236}">
-                  <a16:creationId xmlns:a16="http://schemas.microsoft.com/office/drawing/2014/main" id="{131D47AD-B39E-42BA-BEDF-505BCF8DC525}"/>
-                </a:ext>
-              </a:extLst>
-            </p:cNvPr>
-            <p:cNvSpPr/>
-            <p:nvPr/>
-          </p:nvSpPr>
-          <p:spPr>
-            <a:xfrm>
-              <a:off x="3501390" y="1390651"/>
-              <a:ext cx="4594860" cy="809266"/>
-            </a:xfrm>
-            <a:prstGeom prst="snip1Rect">
-              <a:avLst>
-                <a:gd name="adj" fmla="val 24957"/>
-              </a:avLst>
-            </a:prstGeom>
-            <a:noFill/>
-            <a:ln w="38100">
-              <a:solidFill>
-                <a:srgbClr val="A49E9E"/>
-              </a:solidFill>
-            </a:ln>
-          </p:spPr>
-          <p:style>
-            <a:lnRef idx="2">
-              <a:schemeClr val="accent1">
-                <a:shade val="50000"/>
-              </a:schemeClr>
-            </a:lnRef>
-            <a:fillRef idx="1">
-              <a:schemeClr val="accent1"/>
-            </a:fillRef>
-            <a:effectRef idx="0">
-              <a:schemeClr val="accent1"/>
-            </a:effectRef>
-            <a:fontRef idx="minor">
-              <a:schemeClr val="lt1"/>
-            </a:fontRef>
-          </p:style>
-          <p:txBody>
-            <a:bodyPr rtlCol="0" anchor="ctr"/>
-            <a:lstStyle/>
-            <a:p>
-              <a:pPr algn="ctr"/>
-              <a:endParaRPr lang="en-US"/>
-            </a:p>
-          </p:txBody>
-        </p:sp>
-      </p:grpSp>
+        </p:nvSpPr>
+        <p:spPr>
+          <a:xfrm>
+            <a:off x="1729051" y="1578001"/>
+            <a:ext cx="8733898" cy="809266"/>
+          </a:xfrm>
+          <a:prstGeom prst="snip1Rect">
+            <a:avLst>
+              <a:gd name="adj" fmla="val 24957"/>
+            </a:avLst>
+          </a:prstGeom>
+          <a:noFill/>
+          <a:ln w="38100">
+            <a:solidFill>
+              <a:srgbClr val="A49E9E"/>
+            </a:solidFill>
+          </a:ln>
+        </p:spPr>
+        <p:style>
+          <a:lnRef idx="2">
+            <a:schemeClr val="accent1">
+              <a:shade val="50000"/>
+            </a:schemeClr>
+          </a:lnRef>
+          <a:fillRef idx="1">
+            <a:schemeClr val="accent1"/>
+          </a:fillRef>
+          <a:effectRef idx="0">
+            <a:schemeClr val="accent1"/>
+          </a:effectRef>
+          <a:fontRef idx="minor">
+            <a:schemeClr val="lt1"/>
+          </a:fontRef>
+        </p:style>
+        <p:txBody>
+          <a:bodyPr rtlCol="0" anchor="ctr"/>
+          <a:lstStyle/>
+          <a:p>
+            <a:pPr algn="ctr"/>
+            <a:endParaRPr lang="en-US"/>
+          </a:p>
+        </p:txBody>
+      </p:sp>
     </p:spTree>
     <p:extLst>
       <p:ext uri="{BB962C8B-B14F-4D97-AF65-F5344CB8AC3E}">
-        <p14:creationId xmlns:p14="http://schemas.microsoft.com/office/powerpoint/2010/main" val="1481000832"/>
+        <p14:creationId xmlns:p14="http://schemas.microsoft.com/office/powerpoint/2010/main" val="2241187688"/>
       </p:ext>
     </p:extLst>
   </p:cSld>
@@ -5717,12 +5580,107 @@
           </a:p>
         </p:txBody>
       </p:sp>
+      <p:sp>
+        <p:nvSpPr>
+          <p:cNvPr id="7" name="Textfeld 6">
+            <a:extLst>
+              <a:ext uri="{FF2B5EF4-FFF2-40B4-BE49-F238E27FC236}">
+                <a16:creationId xmlns:a16="http://schemas.microsoft.com/office/drawing/2014/main" id="{5FD8B385-5599-4DC5-9390-376AD2BF70AB}"/>
+              </a:ext>
+            </a:extLst>
+          </p:cNvPr>
+          <p:cNvSpPr txBox="1"/>
+          <p:nvPr/>
+        </p:nvSpPr>
+        <p:spPr>
+          <a:xfrm>
+            <a:off x="1717640" y="1701973"/>
+            <a:ext cx="8745309" cy="584775"/>
+          </a:xfrm>
+          <a:prstGeom prst="rect">
+            <a:avLst/>
+          </a:prstGeom>
+          <a:noFill/>
+        </p:spPr>
+        <p:txBody>
+          <a:bodyPr wrap="square" rtlCol="0">
+            <a:spAutoFit/>
+          </a:bodyPr>
+          <a:lstStyle/>
+          <a:p>
+            <a:pPr algn="ctr"/>
+            <a:r>
+              <a:rPr lang="en-US" sz="3200" dirty="0">
+                <a:solidFill>
+                  <a:srgbClr val="A49E9E"/>
+                </a:solidFill>
+                <a:latin typeface="Electrolize" panose="02000506000000020004" pitchFamily="2" charset="0"/>
+              </a:rPr>
+              <a:t>Team: Concept outline &amp; sound mapping</a:t>
+            </a:r>
+          </a:p>
+        </p:txBody>
+      </p:sp>
+      <p:sp>
+        <p:nvSpPr>
+          <p:cNvPr id="8" name="Rechteck: eine Ecke abgeschnitten 7">
+            <a:extLst>
+              <a:ext uri="{FF2B5EF4-FFF2-40B4-BE49-F238E27FC236}">
+                <a16:creationId xmlns:a16="http://schemas.microsoft.com/office/drawing/2014/main" id="{EE1813EB-5516-442B-BE86-1998D2191114}"/>
+              </a:ext>
+            </a:extLst>
+          </p:cNvPr>
+          <p:cNvSpPr/>
+          <p:nvPr/>
+        </p:nvSpPr>
+        <p:spPr>
+          <a:xfrm>
+            <a:off x="1729051" y="1578001"/>
+            <a:ext cx="8733898" cy="809266"/>
+          </a:xfrm>
+          <a:prstGeom prst="snip1Rect">
+            <a:avLst>
+              <a:gd name="adj" fmla="val 24957"/>
+            </a:avLst>
+          </a:prstGeom>
+          <a:noFill/>
+          <a:ln w="38100">
+            <a:solidFill>
+              <a:srgbClr val="A49E9E"/>
+            </a:solidFill>
+          </a:ln>
+        </p:spPr>
+        <p:style>
+          <a:lnRef idx="2">
+            <a:schemeClr val="accent1">
+              <a:shade val="50000"/>
+            </a:schemeClr>
+          </a:lnRef>
+          <a:fillRef idx="1">
+            <a:schemeClr val="accent1"/>
+          </a:fillRef>
+          <a:effectRef idx="0">
+            <a:schemeClr val="accent1"/>
+          </a:effectRef>
+          <a:fontRef idx="minor">
+            <a:schemeClr val="lt1"/>
+          </a:fontRef>
+        </p:style>
+        <p:txBody>
+          <a:bodyPr rtlCol="0" anchor="ctr"/>
+          <a:lstStyle/>
+          <a:p>
+            <a:pPr algn="ctr"/>
+            <a:endParaRPr lang="en-US"/>
+          </a:p>
+        </p:txBody>
+      </p:sp>
       <p:grpSp>
         <p:nvGrpSpPr>
-          <p:cNvPr id="4" name="Gruppieren 3">
-            <a:extLst>
-              <a:ext uri="{FF2B5EF4-FFF2-40B4-BE49-F238E27FC236}">
-                <a16:creationId xmlns:a16="http://schemas.microsoft.com/office/drawing/2014/main" id="{DD9243E5-B49E-40AE-B3B2-7D9509A8D214}"/>
+          <p:cNvPr id="12" name="Gruppieren 11">
+            <a:extLst>
+              <a:ext uri="{FF2B5EF4-FFF2-40B4-BE49-F238E27FC236}">
+                <a16:creationId xmlns:a16="http://schemas.microsoft.com/office/drawing/2014/main" id="{07BD05FE-AE5F-44B2-9AEC-B3E33027A5B9}"/>
               </a:ext>
             </a:extLst>
           </p:cNvPr>
@@ -5731,240 +5689,8 @@
         </p:nvGrpSpPr>
         <p:grpSpPr>
           <a:xfrm>
-            <a:off x="440690" y="1578001"/>
-            <a:ext cx="4594860" cy="809266"/>
-            <a:chOff x="3501390" y="1390651"/>
-            <a:chExt cx="4594860" cy="809266"/>
-          </a:xfrm>
-        </p:grpSpPr>
-        <p:sp>
-          <p:nvSpPr>
-            <p:cNvPr id="7" name="Textfeld 6">
-              <a:extLst>
-                <a:ext uri="{FF2B5EF4-FFF2-40B4-BE49-F238E27FC236}">
-                  <a16:creationId xmlns:a16="http://schemas.microsoft.com/office/drawing/2014/main" id="{5FD8B385-5599-4DC5-9390-376AD2BF70AB}"/>
-                </a:ext>
-              </a:extLst>
-            </p:cNvPr>
-            <p:cNvSpPr txBox="1"/>
-            <p:nvPr/>
-          </p:nvSpPr>
-          <p:spPr>
-            <a:xfrm>
-              <a:off x="3501390" y="1514623"/>
-              <a:ext cx="4594860" cy="584775"/>
-            </a:xfrm>
-            <a:prstGeom prst="rect">
-              <a:avLst/>
-            </a:prstGeom>
-            <a:noFill/>
-          </p:spPr>
-          <p:txBody>
-            <a:bodyPr wrap="square" rtlCol="0">
-              <a:spAutoFit/>
-            </a:bodyPr>
-            <a:lstStyle/>
-            <a:p>
-              <a:pPr algn="ctr"/>
-              <a:r>
-                <a:rPr lang="en-US" sz="3200" dirty="0">
-                  <a:solidFill>
-                    <a:srgbClr val="A49E9E"/>
-                  </a:solidFill>
-                  <a:latin typeface="Electrolize" panose="02000506000000020004" pitchFamily="2" charset="0"/>
-                </a:rPr>
-                <a:t>Team: Concept outline</a:t>
-              </a:r>
-            </a:p>
-          </p:txBody>
-        </p:sp>
-        <p:sp>
-          <p:nvSpPr>
-            <p:cNvPr id="8" name="Rechteck: eine Ecke abgeschnitten 7">
-              <a:extLst>
-                <a:ext uri="{FF2B5EF4-FFF2-40B4-BE49-F238E27FC236}">
-                  <a16:creationId xmlns:a16="http://schemas.microsoft.com/office/drawing/2014/main" id="{EE1813EB-5516-442B-BE86-1998D2191114}"/>
-                </a:ext>
-              </a:extLst>
-            </p:cNvPr>
-            <p:cNvSpPr/>
-            <p:nvPr/>
-          </p:nvSpPr>
-          <p:spPr>
-            <a:xfrm>
-              <a:off x="3501390" y="1390651"/>
-              <a:ext cx="4594860" cy="809266"/>
-            </a:xfrm>
-            <a:prstGeom prst="snip1Rect">
-              <a:avLst>
-                <a:gd name="adj" fmla="val 24957"/>
-              </a:avLst>
-            </a:prstGeom>
-            <a:noFill/>
-            <a:ln w="38100">
-              <a:solidFill>
-                <a:srgbClr val="A49E9E"/>
-              </a:solidFill>
-            </a:ln>
-          </p:spPr>
-          <p:style>
-            <a:lnRef idx="2">
-              <a:schemeClr val="accent1">
-                <a:shade val="50000"/>
-              </a:schemeClr>
-            </a:lnRef>
-            <a:fillRef idx="1">
-              <a:schemeClr val="accent1"/>
-            </a:fillRef>
-            <a:effectRef idx="0">
-              <a:schemeClr val="accent1"/>
-            </a:effectRef>
-            <a:fontRef idx="minor">
-              <a:schemeClr val="lt1"/>
-            </a:fontRef>
-          </p:style>
-          <p:txBody>
-            <a:bodyPr rtlCol="0" anchor="ctr"/>
-            <a:lstStyle/>
-            <a:p>
-              <a:pPr algn="ctr"/>
-              <a:endParaRPr lang="en-US"/>
-            </a:p>
-          </p:txBody>
-        </p:sp>
-      </p:grpSp>
-      <p:grpSp>
-        <p:nvGrpSpPr>
-          <p:cNvPr id="9" name="Gruppieren 8">
-            <a:extLst>
-              <a:ext uri="{FF2B5EF4-FFF2-40B4-BE49-F238E27FC236}">
-                <a16:creationId xmlns:a16="http://schemas.microsoft.com/office/drawing/2014/main" id="{8CCB6722-FBB7-4B69-B355-FFEFA853CA50}"/>
-              </a:ext>
-            </a:extLst>
-          </p:cNvPr>
-          <p:cNvGrpSpPr/>
-          <p:nvPr/>
-        </p:nvGrpSpPr>
-        <p:grpSpPr>
-          <a:xfrm>
-            <a:off x="7156452" y="1589727"/>
-            <a:ext cx="4594860" cy="809266"/>
-            <a:chOff x="3501390" y="1390651"/>
-            <a:chExt cx="4594860" cy="809266"/>
-          </a:xfrm>
-        </p:grpSpPr>
-        <p:sp>
-          <p:nvSpPr>
-            <p:cNvPr id="10" name="Textfeld 9">
-              <a:extLst>
-                <a:ext uri="{FF2B5EF4-FFF2-40B4-BE49-F238E27FC236}">
-                  <a16:creationId xmlns:a16="http://schemas.microsoft.com/office/drawing/2014/main" id="{E58A9E9C-8FFA-4979-B5E7-BE6941EA08D5}"/>
-                </a:ext>
-              </a:extLst>
-            </p:cNvPr>
-            <p:cNvSpPr txBox="1"/>
-            <p:nvPr/>
-          </p:nvSpPr>
-          <p:spPr>
-            <a:xfrm>
-              <a:off x="3501390" y="1514623"/>
-              <a:ext cx="4594860" cy="584775"/>
-            </a:xfrm>
-            <a:prstGeom prst="rect">
-              <a:avLst/>
-            </a:prstGeom>
-            <a:noFill/>
-          </p:spPr>
-          <p:txBody>
-            <a:bodyPr wrap="square" rtlCol="0">
-              <a:spAutoFit/>
-            </a:bodyPr>
-            <a:lstStyle/>
-            <a:p>
-              <a:pPr algn="ctr"/>
-              <a:r>
-                <a:rPr lang="en-US" sz="3200" dirty="0">
-                  <a:solidFill>
-                    <a:srgbClr val="A49E9E"/>
-                  </a:solidFill>
-                  <a:latin typeface="Electrolize" panose="02000506000000020004" pitchFamily="2" charset="0"/>
-                </a:rPr>
-                <a:t>Team: Sound mapping</a:t>
-              </a:r>
-            </a:p>
-          </p:txBody>
-        </p:sp>
-        <p:sp>
-          <p:nvSpPr>
-            <p:cNvPr id="11" name="Rechteck: eine Ecke abgeschnitten 10">
-              <a:extLst>
-                <a:ext uri="{FF2B5EF4-FFF2-40B4-BE49-F238E27FC236}">
-                  <a16:creationId xmlns:a16="http://schemas.microsoft.com/office/drawing/2014/main" id="{131D47AD-B39E-42BA-BEDF-505BCF8DC525}"/>
-                </a:ext>
-              </a:extLst>
-            </p:cNvPr>
-            <p:cNvSpPr/>
-            <p:nvPr/>
-          </p:nvSpPr>
-          <p:spPr>
-            <a:xfrm>
-              <a:off x="3501390" y="1390651"/>
-              <a:ext cx="4594860" cy="809266"/>
-            </a:xfrm>
-            <a:prstGeom prst="snip1Rect">
-              <a:avLst>
-                <a:gd name="adj" fmla="val 24957"/>
-              </a:avLst>
-            </a:prstGeom>
-            <a:noFill/>
-            <a:ln w="38100">
-              <a:solidFill>
-                <a:srgbClr val="A49E9E"/>
-              </a:solidFill>
-            </a:ln>
-          </p:spPr>
-          <p:style>
-            <a:lnRef idx="2">
-              <a:schemeClr val="accent1">
-                <a:shade val="50000"/>
-              </a:schemeClr>
-            </a:lnRef>
-            <a:fillRef idx="1">
-              <a:schemeClr val="accent1"/>
-            </a:fillRef>
-            <a:effectRef idx="0">
-              <a:schemeClr val="accent1"/>
-            </a:effectRef>
-            <a:fontRef idx="minor">
-              <a:schemeClr val="lt1"/>
-            </a:fontRef>
-          </p:style>
-          <p:txBody>
-            <a:bodyPr rtlCol="0" anchor="ctr"/>
-            <a:lstStyle/>
-            <a:p>
-              <a:pPr algn="ctr"/>
-              <a:endParaRPr lang="en-US"/>
-            </a:p>
-          </p:txBody>
-        </p:sp>
-      </p:grpSp>
-      <p:grpSp>
-        <p:nvGrpSpPr>
-          <p:cNvPr id="12" name="Gruppieren 11">
-            <a:extLst>
-              <a:ext uri="{FF2B5EF4-FFF2-40B4-BE49-F238E27FC236}">
-                <a16:creationId xmlns:a16="http://schemas.microsoft.com/office/drawing/2014/main" id="{07BD05FE-AE5F-44B2-9AEC-B3E33027A5B9}"/>
-              </a:ext>
-            </a:extLst>
-          </p:cNvPr>
-          <p:cNvGrpSpPr/>
-          <p:nvPr/>
-        </p:nvGrpSpPr>
-        <p:grpSpPr>
-          <a:xfrm>
-            <a:off x="3798570" y="3590152"/>
-            <a:ext cx="4594860" cy="809266"/>
+            <a:off x="3330854" y="3590152"/>
+            <a:ext cx="5530292" cy="809266"/>
             <a:chOff x="3501390" y="1390651"/>
             <a:chExt cx="4594860" cy="809266"/>
           </a:xfrm>
@@ -6067,29 +5793,28 @@
       </p:grpSp>
       <p:cxnSp>
         <p:nvCxnSpPr>
-          <p:cNvPr id="22" name="Verbinder: gewinkelt 21">
-            <a:extLst>
-              <a:ext uri="{FF2B5EF4-FFF2-40B4-BE49-F238E27FC236}">
-                <a16:creationId xmlns:a16="http://schemas.microsoft.com/office/drawing/2014/main" id="{3C1FE528-3847-4122-83EA-E3DF1C882A1A}"/>
+          <p:cNvPr id="26" name="Gerade Verbindung mit Pfeil 25">
+            <a:extLst>
+              <a:ext uri="{FF2B5EF4-FFF2-40B4-BE49-F238E27FC236}">
+                <a16:creationId xmlns:a16="http://schemas.microsoft.com/office/drawing/2014/main" id="{10D3FD02-07D0-43D0-8CAC-427D8C83F8B0}"/>
               </a:ext>
             </a:extLst>
           </p:cNvPr>
           <p:cNvCxnSpPr>
-            <a:cxnSpLocks/>
             <a:stCxn id="8" idx="1"/>
             <a:endCxn id="14" idx="3"/>
           </p:cNvCxnSpPr>
           <p:nvPr/>
         </p:nvCxnSpPr>
         <p:spPr>
-          <a:xfrm rot="16200000" flipH="1">
-            <a:off x="3815618" y="1309769"/>
-            <a:ext cx="1202885" cy="3357880"/>
-          </a:xfrm>
-          <a:prstGeom prst="bentConnector3">
+          <a:xfrm>
+            <a:off x="6096000" y="2387267"/>
+            <a:ext cx="0" cy="1202885"/>
+          </a:xfrm>
+          <a:prstGeom prst="straightConnector1">
             <a:avLst/>
           </a:prstGeom>
-          <a:ln w="28575">
+          <a:ln w="38100">
             <a:solidFill>
               <a:srgbClr val="A49E9E"/>
             </a:solidFill>
@@ -6111,54 +5836,10 @@
           </a:fontRef>
         </p:style>
       </p:cxnSp>
-      <p:cxnSp>
-        <p:nvCxnSpPr>
-          <p:cNvPr id="28" name="Verbinder: gewinkelt 27">
-            <a:extLst>
-              <a:ext uri="{FF2B5EF4-FFF2-40B4-BE49-F238E27FC236}">
-                <a16:creationId xmlns:a16="http://schemas.microsoft.com/office/drawing/2014/main" id="{1A9C746D-CECC-4EC1-9795-BBDA91C537A9}"/>
-              </a:ext>
-            </a:extLst>
-          </p:cNvPr>
-          <p:cNvCxnSpPr>
-            <a:cxnSpLocks/>
-            <a:stCxn id="11" idx="1"/>
-          </p:cNvCxnSpPr>
-          <p:nvPr/>
-        </p:nvCxnSpPr>
-        <p:spPr>
-          <a:xfrm rot="5400000">
-            <a:off x="7478937" y="1016056"/>
-            <a:ext cx="592009" cy="3357882"/>
-          </a:xfrm>
-          <a:prstGeom prst="bentConnector2">
-            <a:avLst/>
-          </a:prstGeom>
-          <a:ln w="28575">
-            <a:solidFill>
-              <a:srgbClr val="A49E9E"/>
-            </a:solidFill>
-          </a:ln>
-        </p:spPr>
-        <p:style>
-          <a:lnRef idx="1">
-            <a:schemeClr val="accent1"/>
-          </a:lnRef>
-          <a:fillRef idx="0">
-            <a:schemeClr val="accent1"/>
-          </a:fillRef>
-          <a:effectRef idx="0">
-            <a:schemeClr val="accent1"/>
-          </a:effectRef>
-          <a:fontRef idx="minor">
-            <a:schemeClr val="tx1"/>
-          </a:fontRef>
-        </p:style>
-      </p:cxnSp>
     </p:spTree>
     <p:extLst>
       <p:ext uri="{BB962C8B-B14F-4D97-AF65-F5344CB8AC3E}">
-        <p14:creationId xmlns:p14="http://schemas.microsoft.com/office/powerpoint/2010/main" val="655755824"/>
+        <p14:creationId xmlns:p14="http://schemas.microsoft.com/office/powerpoint/2010/main" val="66948206"/>
       </p:ext>
     </p:extLst>
   </p:cSld>
@@ -6279,12 +5960,107 @@
           </a:p>
         </p:txBody>
       </p:sp>
+      <p:sp>
+        <p:nvSpPr>
+          <p:cNvPr id="7" name="Textfeld 6">
+            <a:extLst>
+              <a:ext uri="{FF2B5EF4-FFF2-40B4-BE49-F238E27FC236}">
+                <a16:creationId xmlns:a16="http://schemas.microsoft.com/office/drawing/2014/main" id="{5FD8B385-5599-4DC5-9390-376AD2BF70AB}"/>
+              </a:ext>
+            </a:extLst>
+          </p:cNvPr>
+          <p:cNvSpPr txBox="1"/>
+          <p:nvPr/>
+        </p:nvSpPr>
+        <p:spPr>
+          <a:xfrm>
+            <a:off x="1717640" y="1701973"/>
+            <a:ext cx="8745309" cy="584775"/>
+          </a:xfrm>
+          <a:prstGeom prst="rect">
+            <a:avLst/>
+          </a:prstGeom>
+          <a:noFill/>
+        </p:spPr>
+        <p:txBody>
+          <a:bodyPr wrap="square" rtlCol="0">
+            <a:spAutoFit/>
+          </a:bodyPr>
+          <a:lstStyle/>
+          <a:p>
+            <a:pPr algn="ctr"/>
+            <a:r>
+              <a:rPr lang="en-US" sz="3200" dirty="0">
+                <a:solidFill>
+                  <a:srgbClr val="A49E9E"/>
+                </a:solidFill>
+                <a:latin typeface="Electrolize" panose="02000506000000020004" pitchFamily="2" charset="0"/>
+              </a:rPr>
+              <a:t>Team: Concept outline &amp; sound mapping</a:t>
+            </a:r>
+          </a:p>
+        </p:txBody>
+      </p:sp>
+      <p:sp>
+        <p:nvSpPr>
+          <p:cNvPr id="8" name="Rechteck: eine Ecke abgeschnitten 7">
+            <a:extLst>
+              <a:ext uri="{FF2B5EF4-FFF2-40B4-BE49-F238E27FC236}">
+                <a16:creationId xmlns:a16="http://schemas.microsoft.com/office/drawing/2014/main" id="{EE1813EB-5516-442B-BE86-1998D2191114}"/>
+              </a:ext>
+            </a:extLst>
+          </p:cNvPr>
+          <p:cNvSpPr/>
+          <p:nvPr/>
+        </p:nvSpPr>
+        <p:spPr>
+          <a:xfrm>
+            <a:off x="1729051" y="1578001"/>
+            <a:ext cx="8733898" cy="809266"/>
+          </a:xfrm>
+          <a:prstGeom prst="snip1Rect">
+            <a:avLst>
+              <a:gd name="adj" fmla="val 24957"/>
+            </a:avLst>
+          </a:prstGeom>
+          <a:noFill/>
+          <a:ln w="38100">
+            <a:solidFill>
+              <a:srgbClr val="A49E9E"/>
+            </a:solidFill>
+          </a:ln>
+        </p:spPr>
+        <p:style>
+          <a:lnRef idx="2">
+            <a:schemeClr val="accent1">
+              <a:shade val="50000"/>
+            </a:schemeClr>
+          </a:lnRef>
+          <a:fillRef idx="1">
+            <a:schemeClr val="accent1"/>
+          </a:fillRef>
+          <a:effectRef idx="0">
+            <a:schemeClr val="accent1"/>
+          </a:effectRef>
+          <a:fontRef idx="minor">
+            <a:schemeClr val="lt1"/>
+          </a:fontRef>
+        </p:style>
+        <p:txBody>
+          <a:bodyPr rtlCol="0" anchor="ctr"/>
+          <a:lstStyle/>
+          <a:p>
+            <a:pPr algn="ctr"/>
+            <a:endParaRPr lang="en-US"/>
+          </a:p>
+        </p:txBody>
+      </p:sp>
       <p:grpSp>
         <p:nvGrpSpPr>
-          <p:cNvPr id="4" name="Gruppieren 3">
-            <a:extLst>
-              <a:ext uri="{FF2B5EF4-FFF2-40B4-BE49-F238E27FC236}">
-                <a16:creationId xmlns:a16="http://schemas.microsoft.com/office/drawing/2014/main" id="{DD9243E5-B49E-40AE-B3B2-7D9509A8D214}"/>
+          <p:cNvPr id="12" name="Gruppieren 11">
+            <a:extLst>
+              <a:ext uri="{FF2B5EF4-FFF2-40B4-BE49-F238E27FC236}">
+                <a16:creationId xmlns:a16="http://schemas.microsoft.com/office/drawing/2014/main" id="{07BD05FE-AE5F-44B2-9AEC-B3E33027A5B9}"/>
               </a:ext>
             </a:extLst>
           </p:cNvPr>
@@ -6293,240 +6069,8 @@
         </p:nvGrpSpPr>
         <p:grpSpPr>
           <a:xfrm>
-            <a:off x="440690" y="1578001"/>
-            <a:ext cx="4594860" cy="809266"/>
-            <a:chOff x="3501390" y="1390651"/>
-            <a:chExt cx="4594860" cy="809266"/>
-          </a:xfrm>
-        </p:grpSpPr>
-        <p:sp>
-          <p:nvSpPr>
-            <p:cNvPr id="7" name="Textfeld 6">
-              <a:extLst>
-                <a:ext uri="{FF2B5EF4-FFF2-40B4-BE49-F238E27FC236}">
-                  <a16:creationId xmlns:a16="http://schemas.microsoft.com/office/drawing/2014/main" id="{5FD8B385-5599-4DC5-9390-376AD2BF70AB}"/>
-                </a:ext>
-              </a:extLst>
-            </p:cNvPr>
-            <p:cNvSpPr txBox="1"/>
-            <p:nvPr/>
-          </p:nvSpPr>
-          <p:spPr>
-            <a:xfrm>
-              <a:off x="3501390" y="1514623"/>
-              <a:ext cx="4594860" cy="584775"/>
-            </a:xfrm>
-            <a:prstGeom prst="rect">
-              <a:avLst/>
-            </a:prstGeom>
-            <a:noFill/>
-          </p:spPr>
-          <p:txBody>
-            <a:bodyPr wrap="square" rtlCol="0">
-              <a:spAutoFit/>
-            </a:bodyPr>
-            <a:lstStyle/>
-            <a:p>
-              <a:pPr algn="ctr"/>
-              <a:r>
-                <a:rPr lang="en-US" sz="3200" dirty="0">
-                  <a:solidFill>
-                    <a:srgbClr val="A49E9E"/>
-                  </a:solidFill>
-                  <a:latin typeface="Electrolize" panose="02000506000000020004" pitchFamily="2" charset="0"/>
-                </a:rPr>
-                <a:t>Team: Concept outline</a:t>
-              </a:r>
-            </a:p>
-          </p:txBody>
-        </p:sp>
-        <p:sp>
-          <p:nvSpPr>
-            <p:cNvPr id="8" name="Rechteck: eine Ecke abgeschnitten 7">
-              <a:extLst>
-                <a:ext uri="{FF2B5EF4-FFF2-40B4-BE49-F238E27FC236}">
-                  <a16:creationId xmlns:a16="http://schemas.microsoft.com/office/drawing/2014/main" id="{EE1813EB-5516-442B-BE86-1998D2191114}"/>
-                </a:ext>
-              </a:extLst>
-            </p:cNvPr>
-            <p:cNvSpPr/>
-            <p:nvPr/>
-          </p:nvSpPr>
-          <p:spPr>
-            <a:xfrm>
-              <a:off x="3501390" y="1390651"/>
-              <a:ext cx="4594860" cy="809266"/>
-            </a:xfrm>
-            <a:prstGeom prst="snip1Rect">
-              <a:avLst>
-                <a:gd name="adj" fmla="val 24957"/>
-              </a:avLst>
-            </a:prstGeom>
-            <a:noFill/>
-            <a:ln w="38100">
-              <a:solidFill>
-                <a:srgbClr val="A49E9E"/>
-              </a:solidFill>
-            </a:ln>
-          </p:spPr>
-          <p:style>
-            <a:lnRef idx="2">
-              <a:schemeClr val="accent1">
-                <a:shade val="50000"/>
-              </a:schemeClr>
-            </a:lnRef>
-            <a:fillRef idx="1">
-              <a:schemeClr val="accent1"/>
-            </a:fillRef>
-            <a:effectRef idx="0">
-              <a:schemeClr val="accent1"/>
-            </a:effectRef>
-            <a:fontRef idx="minor">
-              <a:schemeClr val="lt1"/>
-            </a:fontRef>
-          </p:style>
-          <p:txBody>
-            <a:bodyPr rtlCol="0" anchor="ctr"/>
-            <a:lstStyle/>
-            <a:p>
-              <a:pPr algn="ctr"/>
-              <a:endParaRPr lang="en-US"/>
-            </a:p>
-          </p:txBody>
-        </p:sp>
-      </p:grpSp>
-      <p:grpSp>
-        <p:nvGrpSpPr>
-          <p:cNvPr id="9" name="Gruppieren 8">
-            <a:extLst>
-              <a:ext uri="{FF2B5EF4-FFF2-40B4-BE49-F238E27FC236}">
-                <a16:creationId xmlns:a16="http://schemas.microsoft.com/office/drawing/2014/main" id="{8CCB6722-FBB7-4B69-B355-FFEFA853CA50}"/>
-              </a:ext>
-            </a:extLst>
-          </p:cNvPr>
-          <p:cNvGrpSpPr/>
-          <p:nvPr/>
-        </p:nvGrpSpPr>
-        <p:grpSpPr>
-          <a:xfrm>
-            <a:off x="7156452" y="1589727"/>
-            <a:ext cx="4594860" cy="809266"/>
-            <a:chOff x="3501390" y="1390651"/>
-            <a:chExt cx="4594860" cy="809266"/>
-          </a:xfrm>
-        </p:grpSpPr>
-        <p:sp>
-          <p:nvSpPr>
-            <p:cNvPr id="10" name="Textfeld 9">
-              <a:extLst>
-                <a:ext uri="{FF2B5EF4-FFF2-40B4-BE49-F238E27FC236}">
-                  <a16:creationId xmlns:a16="http://schemas.microsoft.com/office/drawing/2014/main" id="{E58A9E9C-8FFA-4979-B5E7-BE6941EA08D5}"/>
-                </a:ext>
-              </a:extLst>
-            </p:cNvPr>
-            <p:cNvSpPr txBox="1"/>
-            <p:nvPr/>
-          </p:nvSpPr>
-          <p:spPr>
-            <a:xfrm>
-              <a:off x="3501390" y="1514623"/>
-              <a:ext cx="4594860" cy="584775"/>
-            </a:xfrm>
-            <a:prstGeom prst="rect">
-              <a:avLst/>
-            </a:prstGeom>
-            <a:noFill/>
-          </p:spPr>
-          <p:txBody>
-            <a:bodyPr wrap="square" rtlCol="0">
-              <a:spAutoFit/>
-            </a:bodyPr>
-            <a:lstStyle/>
-            <a:p>
-              <a:pPr algn="ctr"/>
-              <a:r>
-                <a:rPr lang="en-US" sz="3200" dirty="0">
-                  <a:solidFill>
-                    <a:srgbClr val="A49E9E"/>
-                  </a:solidFill>
-                  <a:latin typeface="Electrolize" panose="02000506000000020004" pitchFamily="2" charset="0"/>
-                </a:rPr>
-                <a:t>Team: Sound mapping</a:t>
-              </a:r>
-            </a:p>
-          </p:txBody>
-        </p:sp>
-        <p:sp>
-          <p:nvSpPr>
-            <p:cNvPr id="11" name="Rechteck: eine Ecke abgeschnitten 10">
-              <a:extLst>
-                <a:ext uri="{FF2B5EF4-FFF2-40B4-BE49-F238E27FC236}">
-                  <a16:creationId xmlns:a16="http://schemas.microsoft.com/office/drawing/2014/main" id="{131D47AD-B39E-42BA-BEDF-505BCF8DC525}"/>
-                </a:ext>
-              </a:extLst>
-            </p:cNvPr>
-            <p:cNvSpPr/>
-            <p:nvPr/>
-          </p:nvSpPr>
-          <p:spPr>
-            <a:xfrm>
-              <a:off x="3501390" y="1390651"/>
-              <a:ext cx="4594860" cy="809266"/>
-            </a:xfrm>
-            <a:prstGeom prst="snip1Rect">
-              <a:avLst>
-                <a:gd name="adj" fmla="val 24957"/>
-              </a:avLst>
-            </a:prstGeom>
-            <a:noFill/>
-            <a:ln w="38100">
-              <a:solidFill>
-                <a:srgbClr val="A49E9E"/>
-              </a:solidFill>
-            </a:ln>
-          </p:spPr>
-          <p:style>
-            <a:lnRef idx="2">
-              <a:schemeClr val="accent1">
-                <a:shade val="50000"/>
-              </a:schemeClr>
-            </a:lnRef>
-            <a:fillRef idx="1">
-              <a:schemeClr val="accent1"/>
-            </a:fillRef>
-            <a:effectRef idx="0">
-              <a:schemeClr val="accent1"/>
-            </a:effectRef>
-            <a:fontRef idx="minor">
-              <a:schemeClr val="lt1"/>
-            </a:fontRef>
-          </p:style>
-          <p:txBody>
-            <a:bodyPr rtlCol="0" anchor="ctr"/>
-            <a:lstStyle/>
-            <a:p>
-              <a:pPr algn="ctr"/>
-              <a:endParaRPr lang="en-US"/>
-            </a:p>
-          </p:txBody>
-        </p:sp>
-      </p:grpSp>
-      <p:grpSp>
-        <p:nvGrpSpPr>
-          <p:cNvPr id="12" name="Gruppieren 11">
-            <a:extLst>
-              <a:ext uri="{FF2B5EF4-FFF2-40B4-BE49-F238E27FC236}">
-                <a16:creationId xmlns:a16="http://schemas.microsoft.com/office/drawing/2014/main" id="{07BD05FE-AE5F-44B2-9AEC-B3E33027A5B9}"/>
-              </a:ext>
-            </a:extLst>
-          </p:cNvPr>
-          <p:cNvGrpSpPr/>
-          <p:nvPr/>
-        </p:nvGrpSpPr>
-        <p:grpSpPr>
-          <a:xfrm>
-            <a:off x="3798570" y="3590152"/>
-            <a:ext cx="4594860" cy="809266"/>
+            <a:off x="3330854" y="3590152"/>
+            <a:ext cx="5530292" cy="809266"/>
             <a:chOff x="3501390" y="1390651"/>
             <a:chExt cx="4594860" cy="809266"/>
           </a:xfrm>
@@ -6627,263 +6171,125 @@
           </p:txBody>
         </p:sp>
       </p:grpSp>
-      <p:grpSp>
-        <p:nvGrpSpPr>
-          <p:cNvPr id="15" name="Gruppieren 14">
-            <a:extLst>
-              <a:ext uri="{FF2B5EF4-FFF2-40B4-BE49-F238E27FC236}">
-                <a16:creationId xmlns:a16="http://schemas.microsoft.com/office/drawing/2014/main" id="{69E81792-EF25-4FF1-80C2-F6B41A5DDD49}"/>
-              </a:ext>
-            </a:extLst>
-          </p:cNvPr>
-          <p:cNvGrpSpPr/>
+      <p:sp>
+        <p:nvSpPr>
+          <p:cNvPr id="16" name="Textfeld 15">
+            <a:extLst>
+              <a:ext uri="{FF2B5EF4-FFF2-40B4-BE49-F238E27FC236}">
+                <a16:creationId xmlns:a16="http://schemas.microsoft.com/office/drawing/2014/main" id="{AC4B62F8-07A9-466D-9BB8-1974A4ADCD4D}"/>
+              </a:ext>
+            </a:extLst>
+          </p:cNvPr>
+          <p:cNvSpPr txBox="1"/>
           <p:nvPr/>
-        </p:nvGrpSpPr>
-        <p:grpSpPr>
-          <a:xfrm>
-            <a:off x="421640" y="5602303"/>
-            <a:ext cx="4594860" cy="809266"/>
-            <a:chOff x="3501390" y="1390651"/>
-            <a:chExt cx="4594860" cy="809266"/>
-          </a:xfrm>
-        </p:grpSpPr>
-        <p:sp>
-          <p:nvSpPr>
-            <p:cNvPr id="16" name="Textfeld 15">
-              <a:extLst>
-                <a:ext uri="{FF2B5EF4-FFF2-40B4-BE49-F238E27FC236}">
-                  <a16:creationId xmlns:a16="http://schemas.microsoft.com/office/drawing/2014/main" id="{AC4B62F8-07A9-466D-9BB8-1974A4ADCD4D}"/>
-                </a:ext>
-              </a:extLst>
-            </p:cNvPr>
-            <p:cNvSpPr txBox="1"/>
-            <p:nvPr/>
-          </p:nvSpPr>
-          <p:spPr>
-            <a:xfrm>
-              <a:off x="3501390" y="1514623"/>
-              <a:ext cx="4594860" cy="584775"/>
-            </a:xfrm>
-            <a:prstGeom prst="rect">
-              <a:avLst/>
-            </a:prstGeom>
-            <a:noFill/>
-          </p:spPr>
-          <p:txBody>
-            <a:bodyPr wrap="square" rtlCol="0">
-              <a:spAutoFit/>
-            </a:bodyPr>
-            <a:lstStyle/>
-            <a:p>
-              <a:pPr algn="ctr"/>
-              <a:r>
-                <a:rPr lang="en-US" sz="3200" dirty="0">
-                  <a:solidFill>
-                    <a:srgbClr val="A49E9E"/>
-                  </a:solidFill>
-                  <a:latin typeface="Electrolize" panose="02000506000000020004" pitchFamily="2" charset="0"/>
-                </a:rPr>
-                <a:t>Team: Progress update</a:t>
-              </a:r>
-            </a:p>
-          </p:txBody>
-        </p:sp>
-        <p:sp>
-          <p:nvSpPr>
-            <p:cNvPr id="17" name="Rechteck: eine Ecke abgeschnitten 16">
-              <a:extLst>
-                <a:ext uri="{FF2B5EF4-FFF2-40B4-BE49-F238E27FC236}">
-                  <a16:creationId xmlns:a16="http://schemas.microsoft.com/office/drawing/2014/main" id="{41F6BFD2-AC6B-45FC-BB0C-1D2644083051}"/>
-                </a:ext>
-              </a:extLst>
-            </p:cNvPr>
-            <p:cNvSpPr/>
-            <p:nvPr/>
-          </p:nvSpPr>
-          <p:spPr>
-            <a:xfrm>
-              <a:off x="3501390" y="1390651"/>
-              <a:ext cx="4594860" cy="809266"/>
-            </a:xfrm>
-            <a:prstGeom prst="snip1Rect">
-              <a:avLst>
-                <a:gd name="adj" fmla="val 24957"/>
-              </a:avLst>
-            </a:prstGeom>
-            <a:noFill/>
-            <a:ln w="38100">
-              <a:solidFill>
-                <a:srgbClr val="A49E9E"/>
-              </a:solidFill>
-            </a:ln>
-          </p:spPr>
-          <p:style>
-            <a:lnRef idx="2">
-              <a:schemeClr val="accent1">
-                <a:shade val="50000"/>
-              </a:schemeClr>
-            </a:lnRef>
-            <a:fillRef idx="1">
-              <a:schemeClr val="accent1"/>
-            </a:fillRef>
-            <a:effectRef idx="0">
-              <a:schemeClr val="accent1"/>
-            </a:effectRef>
-            <a:fontRef idx="minor">
-              <a:schemeClr val="lt1"/>
-            </a:fontRef>
-          </p:style>
-          <p:txBody>
-            <a:bodyPr rtlCol="0" anchor="ctr"/>
-            <a:lstStyle/>
-            <a:p>
-              <a:pPr algn="ctr"/>
-              <a:endParaRPr lang="en-US"/>
-            </a:p>
-          </p:txBody>
-        </p:sp>
-      </p:grpSp>
-      <p:grpSp>
-        <p:nvGrpSpPr>
-          <p:cNvPr id="18" name="Gruppieren 17">
-            <a:extLst>
-              <a:ext uri="{FF2B5EF4-FFF2-40B4-BE49-F238E27FC236}">
-                <a16:creationId xmlns:a16="http://schemas.microsoft.com/office/drawing/2014/main" id="{2D1BA1A9-85AE-4259-8BF1-9147B6966A88}"/>
-              </a:ext>
-            </a:extLst>
-          </p:cNvPr>
-          <p:cNvGrpSpPr/>
+        </p:nvSpPr>
+        <p:spPr>
+          <a:xfrm>
+            <a:off x="1729050" y="5726275"/>
+            <a:ext cx="8666701" cy="584775"/>
+          </a:xfrm>
+          <a:prstGeom prst="rect">
+            <a:avLst/>
+          </a:prstGeom>
+          <a:noFill/>
+        </p:spPr>
+        <p:txBody>
+          <a:bodyPr wrap="square" rtlCol="0">
+            <a:spAutoFit/>
+          </a:bodyPr>
+          <a:lstStyle/>
+          <a:p>
+            <a:pPr algn="ctr"/>
+            <a:r>
+              <a:rPr lang="en-US" sz="3200" dirty="0">
+                <a:solidFill>
+                  <a:srgbClr val="A49E9E"/>
+                </a:solidFill>
+                <a:latin typeface="Electrolize" panose="02000506000000020004" pitchFamily="2" charset="0"/>
+              </a:rPr>
+              <a:t>Team: Progress updates &amp; presentation</a:t>
+            </a:r>
+          </a:p>
+        </p:txBody>
+      </p:sp>
+      <p:sp>
+        <p:nvSpPr>
+          <p:cNvPr id="17" name="Rechteck: eine Ecke abgeschnitten 16">
+            <a:extLst>
+              <a:ext uri="{FF2B5EF4-FFF2-40B4-BE49-F238E27FC236}">
+                <a16:creationId xmlns:a16="http://schemas.microsoft.com/office/drawing/2014/main" id="{41F6BFD2-AC6B-45FC-BB0C-1D2644083051}"/>
+              </a:ext>
+            </a:extLst>
+          </p:cNvPr>
+          <p:cNvSpPr/>
           <p:nvPr/>
-        </p:nvGrpSpPr>
-        <p:grpSpPr>
-          <a:xfrm>
-            <a:off x="7156452" y="5602303"/>
-            <a:ext cx="4594860" cy="809266"/>
-            <a:chOff x="3501390" y="1390651"/>
-            <a:chExt cx="4594860" cy="809266"/>
-          </a:xfrm>
-        </p:grpSpPr>
-        <p:sp>
-          <p:nvSpPr>
-            <p:cNvPr id="19" name="Textfeld 18">
-              <a:extLst>
-                <a:ext uri="{FF2B5EF4-FFF2-40B4-BE49-F238E27FC236}">
-                  <a16:creationId xmlns:a16="http://schemas.microsoft.com/office/drawing/2014/main" id="{C6751D6C-0737-4198-9991-BD76F1421910}"/>
-                </a:ext>
-              </a:extLst>
-            </p:cNvPr>
-            <p:cNvSpPr txBox="1"/>
-            <p:nvPr/>
-          </p:nvSpPr>
-          <p:spPr>
-            <a:xfrm>
-              <a:off x="3501390" y="1514623"/>
-              <a:ext cx="4594860" cy="584775"/>
-            </a:xfrm>
-            <a:prstGeom prst="rect">
-              <a:avLst/>
-            </a:prstGeom>
-            <a:noFill/>
-          </p:spPr>
-          <p:txBody>
-            <a:bodyPr wrap="square" rtlCol="0">
-              <a:spAutoFit/>
-            </a:bodyPr>
-            <a:lstStyle/>
-            <a:p>
-              <a:pPr algn="ctr"/>
-              <a:r>
-                <a:rPr lang="en-US" sz="3200" dirty="0">
-                  <a:solidFill>
-                    <a:srgbClr val="A49E9E"/>
-                  </a:solidFill>
-                  <a:latin typeface="Electrolize" panose="02000506000000020004" pitchFamily="2" charset="0"/>
-                </a:rPr>
-                <a:t>Team: Presentation</a:t>
-              </a:r>
-            </a:p>
-          </p:txBody>
-        </p:sp>
-        <p:sp>
-          <p:nvSpPr>
-            <p:cNvPr id="20" name="Rechteck: eine Ecke abgeschnitten 19">
-              <a:extLst>
-                <a:ext uri="{FF2B5EF4-FFF2-40B4-BE49-F238E27FC236}">
-                  <a16:creationId xmlns:a16="http://schemas.microsoft.com/office/drawing/2014/main" id="{02FC429C-A5F7-44DC-A0F2-ACECD8569899}"/>
-                </a:ext>
-              </a:extLst>
-            </p:cNvPr>
-            <p:cNvSpPr/>
-            <p:nvPr/>
-          </p:nvSpPr>
-          <p:spPr>
-            <a:xfrm>
-              <a:off x="3501390" y="1390651"/>
-              <a:ext cx="4594860" cy="809266"/>
-            </a:xfrm>
-            <a:prstGeom prst="snip1Rect">
-              <a:avLst>
-                <a:gd name="adj" fmla="val 24957"/>
-              </a:avLst>
-            </a:prstGeom>
-            <a:noFill/>
-            <a:ln w="38100">
-              <a:solidFill>
-                <a:srgbClr val="A49E9E"/>
-              </a:solidFill>
-            </a:ln>
-          </p:spPr>
-          <p:style>
-            <a:lnRef idx="2">
-              <a:schemeClr val="accent1">
-                <a:shade val="50000"/>
-              </a:schemeClr>
-            </a:lnRef>
-            <a:fillRef idx="1">
-              <a:schemeClr val="accent1"/>
-            </a:fillRef>
-            <a:effectRef idx="0">
-              <a:schemeClr val="accent1"/>
-            </a:effectRef>
-            <a:fontRef idx="minor">
-              <a:schemeClr val="lt1"/>
-            </a:fontRef>
-          </p:style>
-          <p:txBody>
-            <a:bodyPr rtlCol="0" anchor="ctr"/>
-            <a:lstStyle/>
-            <a:p>
-              <a:pPr algn="ctr"/>
-              <a:endParaRPr lang="en-US"/>
-            </a:p>
-          </p:txBody>
-        </p:sp>
-      </p:grpSp>
+        </p:nvSpPr>
+        <p:spPr>
+          <a:xfrm>
+            <a:off x="1729050" y="5602303"/>
+            <a:ext cx="8666701" cy="809266"/>
+          </a:xfrm>
+          <a:prstGeom prst="snip1Rect">
+            <a:avLst>
+              <a:gd name="adj" fmla="val 24957"/>
+            </a:avLst>
+          </a:prstGeom>
+          <a:noFill/>
+          <a:ln w="38100">
+            <a:solidFill>
+              <a:srgbClr val="A49E9E"/>
+            </a:solidFill>
+          </a:ln>
+        </p:spPr>
+        <p:style>
+          <a:lnRef idx="2">
+            <a:schemeClr val="accent1">
+              <a:shade val="50000"/>
+            </a:schemeClr>
+          </a:lnRef>
+          <a:fillRef idx="1">
+            <a:schemeClr val="accent1"/>
+          </a:fillRef>
+          <a:effectRef idx="0">
+            <a:schemeClr val="accent1"/>
+          </a:effectRef>
+          <a:fontRef idx="minor">
+            <a:schemeClr val="lt1"/>
+          </a:fontRef>
+        </p:style>
+        <p:txBody>
+          <a:bodyPr rtlCol="0" anchor="ctr"/>
+          <a:lstStyle/>
+          <a:p>
+            <a:pPr algn="ctr"/>
+            <a:endParaRPr lang="en-US"/>
+          </a:p>
+        </p:txBody>
+      </p:sp>
       <p:cxnSp>
         <p:nvCxnSpPr>
-          <p:cNvPr id="22" name="Verbinder: gewinkelt 21">
-            <a:extLst>
-              <a:ext uri="{FF2B5EF4-FFF2-40B4-BE49-F238E27FC236}">
-                <a16:creationId xmlns:a16="http://schemas.microsoft.com/office/drawing/2014/main" id="{3C1FE528-3847-4122-83EA-E3DF1C882A1A}"/>
+          <p:cNvPr id="26" name="Gerade Verbindung mit Pfeil 25">
+            <a:extLst>
+              <a:ext uri="{FF2B5EF4-FFF2-40B4-BE49-F238E27FC236}">
+                <a16:creationId xmlns:a16="http://schemas.microsoft.com/office/drawing/2014/main" id="{10D3FD02-07D0-43D0-8CAC-427D8C83F8B0}"/>
               </a:ext>
             </a:extLst>
           </p:cNvPr>
           <p:cNvCxnSpPr>
-            <a:cxnSpLocks/>
             <a:stCxn id="8" idx="1"/>
             <a:endCxn id="14" idx="3"/>
           </p:cNvCxnSpPr>
           <p:nvPr/>
         </p:nvCxnSpPr>
         <p:spPr>
-          <a:xfrm rot="16200000" flipH="1">
-            <a:off x="3815618" y="1309769"/>
-            <a:ext cx="1202885" cy="3357880"/>
-          </a:xfrm>
-          <a:prstGeom prst="bentConnector3">
+          <a:xfrm>
+            <a:off x="6096000" y="2387267"/>
+            <a:ext cx="0" cy="1202885"/>
+          </a:xfrm>
+          <a:prstGeom prst="straightConnector1">
             <a:avLst/>
           </a:prstGeom>
-          <a:ln w="28575">
+          <a:ln w="38100">
             <a:solidFill>
               <a:srgbClr val="A49E9E"/>
             </a:solidFill>
@@ -6907,72 +6313,25 @@
       </p:cxnSp>
       <p:cxnSp>
         <p:nvCxnSpPr>
-          <p:cNvPr id="28" name="Verbinder: gewinkelt 27">
-            <a:extLst>
-              <a:ext uri="{FF2B5EF4-FFF2-40B4-BE49-F238E27FC236}">
-                <a16:creationId xmlns:a16="http://schemas.microsoft.com/office/drawing/2014/main" id="{1A9C746D-CECC-4EC1-9795-BBDA91C537A9}"/>
-              </a:ext>
-            </a:extLst>
-          </p:cNvPr>
-          <p:cNvCxnSpPr>
-            <a:cxnSpLocks/>
-            <a:stCxn id="11" idx="1"/>
-          </p:cNvCxnSpPr>
+          <p:cNvPr id="32" name="Gerade Verbindung mit Pfeil 31">
+            <a:extLst>
+              <a:ext uri="{FF2B5EF4-FFF2-40B4-BE49-F238E27FC236}">
+                <a16:creationId xmlns:a16="http://schemas.microsoft.com/office/drawing/2014/main" id="{A5A5E0F0-7AEB-406A-905A-86671DE87DB3}"/>
+              </a:ext>
+            </a:extLst>
+          </p:cNvPr>
+          <p:cNvCxnSpPr/>
           <p:nvPr/>
         </p:nvCxnSpPr>
         <p:spPr>
-          <a:xfrm rot="5400000">
-            <a:off x="7478937" y="1016056"/>
-            <a:ext cx="592009" cy="3357882"/>
-          </a:xfrm>
-          <a:prstGeom prst="bentConnector2">
+          <a:xfrm>
+            <a:off x="6096000" y="4399418"/>
+            <a:ext cx="0" cy="1202885"/>
+          </a:xfrm>
+          <a:prstGeom prst="straightConnector1">
             <a:avLst/>
           </a:prstGeom>
-          <a:ln w="28575">
-            <a:solidFill>
-              <a:srgbClr val="A49E9E"/>
-            </a:solidFill>
-          </a:ln>
-        </p:spPr>
-        <p:style>
-          <a:lnRef idx="1">
-            <a:schemeClr val="accent1"/>
-          </a:lnRef>
-          <a:fillRef idx="0">
-            <a:schemeClr val="accent1"/>
-          </a:fillRef>
-          <a:effectRef idx="0">
-            <a:schemeClr val="accent1"/>
-          </a:effectRef>
-          <a:fontRef idx="minor">
-            <a:schemeClr val="tx1"/>
-          </a:fontRef>
-        </p:style>
-      </p:cxnSp>
-      <p:cxnSp>
-        <p:nvCxnSpPr>
-          <p:cNvPr id="33" name="Verbinder: gewinkelt 32">
-            <a:extLst>
-              <a:ext uri="{FF2B5EF4-FFF2-40B4-BE49-F238E27FC236}">
-                <a16:creationId xmlns:a16="http://schemas.microsoft.com/office/drawing/2014/main" id="{9BF4DD84-ADA6-478A-875C-CEB85A72CD28}"/>
-              </a:ext>
-            </a:extLst>
-          </p:cNvPr>
-          <p:cNvCxnSpPr>
-            <a:cxnSpLocks/>
-            <a:endCxn id="17" idx="3"/>
-          </p:cNvCxnSpPr>
-          <p:nvPr/>
-        </p:nvCxnSpPr>
-        <p:spPr>
-          <a:xfrm rot="10800000" flipV="1">
-            <a:off x="2719070" y="4991029"/>
-            <a:ext cx="3403600" cy="611273"/>
-          </a:xfrm>
-          <a:prstGeom prst="bentConnector2">
-            <a:avLst/>
-          </a:prstGeom>
-          <a:ln w="28575">
+          <a:ln w="38100">
             <a:solidFill>
               <a:srgbClr val="A49E9E"/>
             </a:solidFill>
@@ -6994,99 +6353,10 @@
           </a:fontRef>
         </p:style>
       </p:cxnSp>
-      <p:cxnSp>
-        <p:nvCxnSpPr>
-          <p:cNvPr id="36" name="Verbinder: gewinkelt 35">
-            <a:extLst>
-              <a:ext uri="{FF2B5EF4-FFF2-40B4-BE49-F238E27FC236}">
-                <a16:creationId xmlns:a16="http://schemas.microsoft.com/office/drawing/2014/main" id="{330D68DE-01EF-40CD-8B73-B945AD462FF1}"/>
-              </a:ext>
-            </a:extLst>
-          </p:cNvPr>
-          <p:cNvCxnSpPr>
-            <a:cxnSpLocks/>
-            <a:endCxn id="20" idx="3"/>
-          </p:cNvCxnSpPr>
-          <p:nvPr/>
-        </p:nvCxnSpPr>
-        <p:spPr>
-          <a:xfrm>
-            <a:off x="6096000" y="4991030"/>
-            <a:ext cx="3357882" cy="611273"/>
-          </a:xfrm>
-          <a:prstGeom prst="bentConnector2">
-            <a:avLst/>
-          </a:prstGeom>
-          <a:ln w="28575">
-            <a:solidFill>
-              <a:srgbClr val="A49E9E"/>
-            </a:solidFill>
-            <a:tailEnd type="triangle"/>
-          </a:ln>
-        </p:spPr>
-        <p:style>
-          <a:lnRef idx="1">
-            <a:schemeClr val="accent1"/>
-          </a:lnRef>
-          <a:fillRef idx="0">
-            <a:schemeClr val="accent1"/>
-          </a:fillRef>
-          <a:effectRef idx="0">
-            <a:schemeClr val="accent1"/>
-          </a:effectRef>
-          <a:fontRef idx="minor">
-            <a:schemeClr val="tx1"/>
-          </a:fontRef>
-        </p:style>
-      </p:cxnSp>
-      <p:cxnSp>
-        <p:nvCxnSpPr>
-          <p:cNvPr id="40" name="Gerader Verbinder 39">
-            <a:extLst>
-              <a:ext uri="{FF2B5EF4-FFF2-40B4-BE49-F238E27FC236}">
-                <a16:creationId xmlns:a16="http://schemas.microsoft.com/office/drawing/2014/main" id="{91A4B97C-3ED8-4F5A-9FE6-C03636884665}"/>
-              </a:ext>
-            </a:extLst>
-          </p:cNvPr>
-          <p:cNvCxnSpPr>
-            <a:cxnSpLocks/>
-            <a:stCxn id="14" idx="1"/>
-          </p:cNvCxnSpPr>
-          <p:nvPr/>
-        </p:nvCxnSpPr>
-        <p:spPr>
-          <a:xfrm>
-            <a:off x="6096000" y="4399418"/>
-            <a:ext cx="0" cy="591611"/>
-          </a:xfrm>
-          <a:prstGeom prst="line">
-            <a:avLst/>
-          </a:prstGeom>
-          <a:ln w="28575">
-            <a:solidFill>
-              <a:srgbClr val="A49E9E"/>
-            </a:solidFill>
-          </a:ln>
-        </p:spPr>
-        <p:style>
-          <a:lnRef idx="1">
-            <a:schemeClr val="accent1"/>
-          </a:lnRef>
-          <a:fillRef idx="0">
-            <a:schemeClr val="accent1"/>
-          </a:fillRef>
-          <a:effectRef idx="0">
-            <a:schemeClr val="accent1"/>
-          </a:effectRef>
-          <a:fontRef idx="minor">
-            <a:schemeClr val="tx1"/>
-          </a:fontRef>
-        </p:style>
-      </p:cxnSp>
     </p:spTree>
     <p:extLst>
       <p:ext uri="{BB962C8B-B14F-4D97-AF65-F5344CB8AC3E}">
-        <p14:creationId xmlns:p14="http://schemas.microsoft.com/office/powerpoint/2010/main" val="1155453912"/>
+        <p14:creationId xmlns:p14="http://schemas.microsoft.com/office/powerpoint/2010/main" val="76694487"/>
       </p:ext>
     </p:extLst>
   </p:cSld>

</xml_diff>